<commit_message>
fix typos in slides + pdf export of slides
</commit_message>
<xml_diff>
--- a/easy-deposit-ui-basics/Presentation.pptx
+++ b/easy-deposit-ui-basics/Presentation.pptx
@@ -199,7 +199,7 @@
           <a:p>
             <a:fld id="{46FF6343-701E-174E-AA11-326D58F329D9}" type="datetimeFigureOut">
               <a:rPr lang="en-US" smtClean="0"/>
-              <a:t>6/18/18</a:t>
+              <a:t>6/19/18</a:t>
             </a:fld>
             <a:endParaRPr lang="en-US"/>
           </a:p>
@@ -595,7 +595,7 @@
           <a:p>
             <a:fld id="{CAB3AEDB-0CE4-724F-8906-26B9AA19027E}" type="datetimeFigureOut">
               <a:rPr lang="en-US" smtClean="0"/>
-              <a:t>6/18/18</a:t>
+              <a:t>6/19/18</a:t>
             </a:fld>
             <a:endParaRPr lang="en-US"/>
           </a:p>
@@ -763,7 +763,7 @@
           <a:p>
             <a:fld id="{CAB3AEDB-0CE4-724F-8906-26B9AA19027E}" type="datetimeFigureOut">
               <a:rPr lang="en-US" smtClean="0"/>
-              <a:t>6/18/18</a:t>
+              <a:t>6/19/18</a:t>
             </a:fld>
             <a:endParaRPr lang="en-US"/>
           </a:p>
@@ -941,7 +941,7 @@
           <a:p>
             <a:fld id="{CAB3AEDB-0CE4-724F-8906-26B9AA19027E}" type="datetimeFigureOut">
               <a:rPr lang="en-US" smtClean="0"/>
-              <a:t>6/18/18</a:t>
+              <a:t>6/19/18</a:t>
             </a:fld>
             <a:endParaRPr lang="en-US"/>
           </a:p>
@@ -1109,7 +1109,7 @@
           <a:p>
             <a:fld id="{CAB3AEDB-0CE4-724F-8906-26B9AA19027E}" type="datetimeFigureOut">
               <a:rPr lang="en-US" smtClean="0"/>
-              <a:t>6/18/18</a:t>
+              <a:t>6/19/18</a:t>
             </a:fld>
             <a:endParaRPr lang="en-US"/>
           </a:p>
@@ -1354,7 +1354,7 @@
           <a:p>
             <a:fld id="{CAB3AEDB-0CE4-724F-8906-26B9AA19027E}" type="datetimeFigureOut">
               <a:rPr lang="en-US" smtClean="0"/>
-              <a:t>6/18/18</a:t>
+              <a:t>6/19/18</a:t>
             </a:fld>
             <a:endParaRPr lang="en-US"/>
           </a:p>
@@ -1583,7 +1583,7 @@
           <a:p>
             <a:fld id="{CAB3AEDB-0CE4-724F-8906-26B9AA19027E}" type="datetimeFigureOut">
               <a:rPr lang="en-US" smtClean="0"/>
-              <a:t>6/18/18</a:t>
+              <a:t>6/19/18</a:t>
             </a:fld>
             <a:endParaRPr lang="en-US"/>
           </a:p>
@@ -1947,7 +1947,7 @@
           <a:p>
             <a:fld id="{CAB3AEDB-0CE4-724F-8906-26B9AA19027E}" type="datetimeFigureOut">
               <a:rPr lang="en-US" smtClean="0"/>
-              <a:t>6/18/18</a:t>
+              <a:t>6/19/18</a:t>
             </a:fld>
             <a:endParaRPr lang="en-US"/>
           </a:p>
@@ -2064,7 +2064,7 @@
           <a:p>
             <a:fld id="{CAB3AEDB-0CE4-724F-8906-26B9AA19027E}" type="datetimeFigureOut">
               <a:rPr lang="en-US" smtClean="0"/>
-              <a:t>6/18/18</a:t>
+              <a:t>6/19/18</a:t>
             </a:fld>
             <a:endParaRPr lang="en-US"/>
           </a:p>
@@ -2159,7 +2159,7 @@
           <a:p>
             <a:fld id="{CAB3AEDB-0CE4-724F-8906-26B9AA19027E}" type="datetimeFigureOut">
               <a:rPr lang="en-US" smtClean="0"/>
-              <a:t>6/18/18</a:t>
+              <a:t>6/19/18</a:t>
             </a:fld>
             <a:endParaRPr lang="en-US"/>
           </a:p>
@@ -2434,7 +2434,7 @@
           <a:p>
             <a:fld id="{CAB3AEDB-0CE4-724F-8906-26B9AA19027E}" type="datetimeFigureOut">
               <a:rPr lang="en-US" smtClean="0"/>
-              <a:t>6/18/18</a:t>
+              <a:t>6/19/18</a:t>
             </a:fld>
             <a:endParaRPr lang="en-US"/>
           </a:p>
@@ -2686,7 +2686,7 @@
           <a:p>
             <a:fld id="{CAB3AEDB-0CE4-724F-8906-26B9AA19027E}" type="datetimeFigureOut">
               <a:rPr lang="en-US" smtClean="0"/>
-              <a:t>6/18/18</a:t>
+              <a:t>6/19/18</a:t>
             </a:fld>
             <a:endParaRPr lang="en-US"/>
           </a:p>
@@ -2897,7 +2897,7 @@
           <a:p>
             <a:fld id="{CAB3AEDB-0CE4-724F-8906-26B9AA19027E}" type="datetimeFigureOut">
               <a:rPr lang="en-US" smtClean="0"/>
-              <a:t>6/18/18</a:t>
+              <a:t>6/19/18</a:t>
             </a:fld>
             <a:endParaRPr lang="en-US"/>
           </a:p>
@@ -3383,7 +3383,7 @@
             <a:pPr algn="l"/>
             <a:fld id="{1E98CFF9-AC77-9F41-A6F7-C65A85AD078C}" type="datetime4">
               <a:rPr lang="en-US" sz="2000" smtClean="0"/>
-              <a:t>June 18, 2018</a:t>
+              <a:t>June 19, 2018</a:t>
             </a:fld>
             <a:endParaRPr lang="en-US" sz="2000" dirty="0"/>
           </a:p>
@@ -3481,13 +3481,8 @@
           <a:p>
             <a:r>
               <a:rPr lang="en-US" dirty="0"/>
-              <a:t>(afternoon) </a:t>
-            </a:r>
-            <a:r>
-              <a:rPr lang="en-US" dirty="0" err="1"/>
-              <a:t>Hacketon</a:t>
-            </a:r>
-            <a:endParaRPr lang="en-US" dirty="0"/>
+              <a:t>(afternoon) Hackathon</a:t>
+            </a:r>
           </a:p>
         </p:txBody>
       </p:sp>
@@ -3537,10 +3532,9 @@
           <a:lstStyle/>
           <a:p>
             <a:r>
-              <a:rPr lang="en-US" dirty="0" err="1"/>
-              <a:t>Hacketon</a:t>
-            </a:r>
-            <a:endParaRPr lang="en-US" dirty="0"/>
+              <a:rPr lang="en-US" dirty="0"/>
+              <a:t>Hackathon</a:t>
+            </a:r>
           </a:p>
         </p:txBody>
       </p:sp>

</xml_diff>

<commit_message>
references to issues in hackathon
</commit_message>
<xml_diff>
--- a/easy-deposit-ui-basics/Presentation.pptx
+++ b/easy-deposit-ui-basics/Presentation.pptx
@@ -5,12 +5,13 @@
     <p:sldMasterId id="2147483648" r:id="rId1"/>
   </p:sldMasterIdLst>
   <p:notesMasterIdLst>
-    <p:notesMasterId r:id="rId5"/>
+    <p:notesMasterId r:id="rId6"/>
   </p:notesMasterIdLst>
   <p:sldIdLst>
     <p:sldId id="256" r:id="rId2"/>
     <p:sldId id="257" r:id="rId3"/>
     <p:sldId id="279" r:id="rId4"/>
+    <p:sldId id="280" r:id="rId5"/>
   </p:sldIdLst>
   <p:sldSz cx="12192000" cy="6858000"/>
   <p:notesSz cx="6858000" cy="9144000"/>
@@ -3567,6 +3568,223 @@
     <p:extLst>
       <p:ext uri="{BB962C8B-B14F-4D97-AF65-F5344CB8AC3E}">
         <p14:creationId xmlns:p14="http://schemas.microsoft.com/office/powerpoint/2010/main" val="52926352"/>
+      </p:ext>
+    </p:extLst>
+  </p:cSld>
+  <p:clrMapOvr>
+    <a:masterClrMapping/>
+  </p:clrMapOvr>
+</p:sld>
+</file>
+
+<file path=ppt/slides/slide4.xml><?xml version="1.0" encoding="utf-8"?>
+<p:sld xmlns:a="http://schemas.openxmlformats.org/drawingml/2006/main" xmlns:r="http://schemas.openxmlformats.org/officeDocument/2006/relationships" xmlns:p="http://schemas.openxmlformats.org/presentationml/2006/main">
+  <p:cSld>
+    <p:spTree>
+      <p:nvGrpSpPr>
+        <p:cNvPr id="1" name=""/>
+        <p:cNvGrpSpPr/>
+        <p:nvPr/>
+      </p:nvGrpSpPr>
+      <p:grpSpPr>
+        <a:xfrm>
+          <a:off x="0" y="0"/>
+          <a:ext cx="0" cy="0"/>
+          <a:chOff x="0" y="0"/>
+          <a:chExt cx="0" cy="0"/>
+        </a:xfrm>
+      </p:grpSpPr>
+      <p:sp>
+        <p:nvSpPr>
+          <p:cNvPr id="2" name="Title 1"/>
+          <p:cNvSpPr>
+            <a:spLocks noGrp="1"/>
+          </p:cNvSpPr>
+          <p:nvPr>
+            <p:ph type="title"/>
+          </p:nvPr>
+        </p:nvSpPr>
+        <p:spPr/>
+        <p:txBody>
+          <a:bodyPr>
+            <a:normAutofit/>
+          </a:bodyPr>
+          <a:lstStyle/>
+          <a:p>
+            <a:r>
+              <a:rPr lang="en-US" dirty="0"/>
+              <a:t>Hackathon</a:t>
+            </a:r>
+            <a:br>
+              <a:rPr lang="en-US" dirty="0"/>
+            </a:br>
+            <a:r>
+              <a:rPr lang="en-US" sz="2400" dirty="0">
+                <a:latin typeface="+mn-lt"/>
+                <a:hlinkClick r:id="rId2"/>
+              </a:rPr>
+              <a:t>http://bit.ly/react-deposit-ui</a:t>
+            </a:r>
+            <a:endParaRPr lang="en-US" dirty="0">
+              <a:latin typeface="+mn-lt"/>
+            </a:endParaRPr>
+          </a:p>
+        </p:txBody>
+      </p:sp>
+      <p:sp>
+        <p:nvSpPr>
+          <p:cNvPr id="8" name="Text Placeholder 7">
+            <a:extLst>
+              <a:ext uri="{FF2B5EF4-FFF2-40B4-BE49-F238E27FC236}">
+                <a16:creationId xmlns:a16="http://schemas.microsoft.com/office/drawing/2014/main" id="{6C2EC511-66C6-5F49-BE6D-2E9BE9BC355E}"/>
+              </a:ext>
+            </a:extLst>
+          </p:cNvPr>
+          <p:cNvSpPr>
+            <a:spLocks noGrp="1"/>
+          </p:cNvSpPr>
+          <p:nvPr>
+            <p:ph type="body" idx="1"/>
+          </p:nvPr>
+        </p:nvSpPr>
+        <p:spPr/>
+        <p:txBody>
+          <a:bodyPr/>
+          <a:lstStyle/>
+          <a:p>
+            <a:r>
+              <a:rPr lang="en-US" dirty="0"/>
+              <a:t>Group </a:t>
+            </a:r>
+            <a:r>
+              <a:rPr lang="en-US" dirty="0">
+                <a:latin typeface="Consolas" panose="020B0609020204030204" pitchFamily="49" charset="0"/>
+                <a:cs typeface="Consolas" panose="020B0609020204030204" pitchFamily="49" charset="0"/>
+              </a:rPr>
+              <a:t>I</a:t>
+            </a:r>
+          </a:p>
+        </p:txBody>
+      </p:sp>
+      <p:sp>
+        <p:nvSpPr>
+          <p:cNvPr id="3" name="Content Placeholder 2"/>
+          <p:cNvSpPr>
+            <a:spLocks noGrp="1"/>
+          </p:cNvSpPr>
+          <p:nvPr>
+            <p:ph sz="half" idx="2"/>
+          </p:nvPr>
+        </p:nvSpPr>
+        <p:spPr/>
+        <p:txBody>
+          <a:bodyPr/>
+          <a:lstStyle/>
+          <a:p>
+            <a:r>
+              <a:rPr lang="en-US" dirty="0"/>
+              <a:t>EASY-1590</a:t>
+            </a:r>
+          </a:p>
+          <a:p>
+            <a:r>
+              <a:rPr lang="en-US" dirty="0"/>
+              <a:t>EASY-1591</a:t>
+            </a:r>
+          </a:p>
+          <a:p>
+            <a:r>
+              <a:rPr lang="en-US" dirty="0"/>
+              <a:t>EASY-1596</a:t>
+            </a:r>
+          </a:p>
+          <a:p>
+            <a:r>
+              <a:rPr lang="en-US" dirty="0"/>
+              <a:t>EASY-1595</a:t>
+            </a:r>
+          </a:p>
+        </p:txBody>
+      </p:sp>
+      <p:sp>
+        <p:nvSpPr>
+          <p:cNvPr id="9" name="Text Placeholder 8">
+            <a:extLst>
+              <a:ext uri="{FF2B5EF4-FFF2-40B4-BE49-F238E27FC236}">
+                <a16:creationId xmlns:a16="http://schemas.microsoft.com/office/drawing/2014/main" id="{CEE41DA4-94FB-5B40-B95A-7C7E82F004EE}"/>
+              </a:ext>
+            </a:extLst>
+          </p:cNvPr>
+          <p:cNvSpPr>
+            <a:spLocks noGrp="1"/>
+          </p:cNvSpPr>
+          <p:nvPr>
+            <p:ph type="body" sz="quarter" idx="3"/>
+          </p:nvPr>
+        </p:nvSpPr>
+        <p:spPr/>
+        <p:txBody>
+          <a:bodyPr/>
+          <a:lstStyle/>
+          <a:p>
+            <a:r>
+              <a:rPr lang="en-US" dirty="0"/>
+              <a:t>Group </a:t>
+            </a:r>
+            <a:r>
+              <a:rPr lang="en-US" dirty="0">
+                <a:latin typeface="Consolas" panose="020B0609020204030204" pitchFamily="49" charset="0"/>
+                <a:cs typeface="Consolas" panose="020B0609020204030204" pitchFamily="49" charset="0"/>
+              </a:rPr>
+              <a:t>II</a:t>
+            </a:r>
+          </a:p>
+        </p:txBody>
+      </p:sp>
+      <p:sp>
+        <p:nvSpPr>
+          <p:cNvPr id="4" name="Content Placeholder 3">
+            <a:extLst>
+              <a:ext uri="{FF2B5EF4-FFF2-40B4-BE49-F238E27FC236}">
+                <a16:creationId xmlns:a16="http://schemas.microsoft.com/office/drawing/2014/main" id="{E884E80D-FF2B-5D42-9F63-B5D737594894}"/>
+              </a:ext>
+            </a:extLst>
+          </p:cNvPr>
+          <p:cNvSpPr>
+            <a:spLocks noGrp="1"/>
+          </p:cNvSpPr>
+          <p:nvPr>
+            <p:ph sz="quarter" idx="4"/>
+          </p:nvPr>
+        </p:nvSpPr>
+        <p:spPr/>
+        <p:txBody>
+          <a:bodyPr/>
+          <a:lstStyle/>
+          <a:p>
+            <a:r>
+              <a:rPr lang="en-US" dirty="0"/>
+              <a:t>EASY-1592</a:t>
+            </a:r>
+          </a:p>
+          <a:p>
+            <a:r>
+              <a:rPr lang="en-US" dirty="0"/>
+              <a:t>EASY-1594</a:t>
+            </a:r>
+          </a:p>
+          <a:p>
+            <a:r>
+              <a:rPr lang="en-US" dirty="0"/>
+              <a:t>EASY-1593</a:t>
+            </a:r>
+          </a:p>
+        </p:txBody>
+      </p:sp>
+    </p:spTree>
+    <p:extLst>
+      <p:ext uri="{BB962C8B-B14F-4D97-AF65-F5344CB8AC3E}">
+        <p14:creationId xmlns:p14="http://schemas.microsoft.com/office/powerpoint/2010/main" val="2309442204"/>
       </p:ext>
     </p:extLst>
   </p:cSld>

</xml_diff>